<commit_message>
Added 100% completion Presentation
</commit_message>
<xml_diff>
--- a/Presentation/Intel Contest_template.pptx
+++ b/Presentation/Intel Contest_template.pptx
@@ -5,17 +5,18 @@
     <p:sldMasterId id="2147483648" r:id="rId1"/>
   </p:sldMasterIdLst>
   <p:notesMasterIdLst>
-    <p:notesMasterId r:id="rId10"/>
+    <p:notesMasterId r:id="rId11"/>
   </p:notesMasterIdLst>
   <p:sldIdLst>
     <p:sldId id="256" r:id="rId2"/>
     <p:sldId id="257" r:id="rId3"/>
     <p:sldId id="258" r:id="rId4"/>
     <p:sldId id="259" r:id="rId5"/>
-    <p:sldId id="260" r:id="rId6"/>
-    <p:sldId id="261" r:id="rId7"/>
-    <p:sldId id="262" r:id="rId8"/>
-    <p:sldId id="263" r:id="rId9"/>
+    <p:sldId id="264" r:id="rId6"/>
+    <p:sldId id="260" r:id="rId7"/>
+    <p:sldId id="261" r:id="rId8"/>
+    <p:sldId id="262" r:id="rId9"/>
+    <p:sldId id="263" r:id="rId10"/>
   </p:sldIdLst>
   <p:sldSz cx="9144000" cy="6858000" type="screen4x3"/>
   <p:notesSz cx="6796088" cy="9874250"/>
@@ -1045,7 +1046,7 @@
       </p:grpSpPr>
       <p:sp>
         <p:nvSpPr>
-          <p:cNvPr id="77" name="CustomShape 1"/>
+          <p:cNvPr id="76" name="CustomShape 1"/>
           <p:cNvSpPr/>
           <p:nvPr/>
         </p:nvSpPr>
@@ -1100,6 +1101,11 @@
         </p:style>
       </p:sp>
     </p:spTree>
+    <p:extLst>
+      <p:ext uri="{BB962C8B-B14F-4D97-AF65-F5344CB8AC3E}">
+        <p14:creationId xmlns:p14="http://schemas.microsoft.com/office/powerpoint/2010/main" val="4013407041"/>
+      </p:ext>
+    </p:extLst>
   </p:cSld>
   <p:clrMapOvr>
     <a:masterClrMapping/>
@@ -1126,14 +1132,14 @@
       </p:grpSpPr>
       <p:sp>
         <p:nvSpPr>
-          <p:cNvPr id="78" name="CustomShape 1"/>
+          <p:cNvPr id="77" name="CustomShape 1"/>
           <p:cNvSpPr/>
           <p:nvPr/>
         </p:nvSpPr>
         <p:spPr>
           <a:xfrm>
-            <a:off x="681120" y="4691160"/>
-            <a:ext cx="5437080" cy="4443480"/>
+            <a:off x="755640" y="5078520"/>
+            <a:ext cx="6048360" cy="4811760"/>
           </a:xfrm>
           <a:custGeom>
             <a:avLst/>
@@ -1180,16 +1186,41 @@
           <a:fontRef idx="minor"/>
         </p:style>
       </p:sp>
-      <p:sp>
-        <p:nvSpPr>
-          <p:cNvPr id="79" name="CustomShape 2"/>
+    </p:spTree>
+  </p:cSld>
+  <p:clrMapOvr>
+    <a:masterClrMapping/>
+  </p:clrMapOvr>
+</p:notes>
+</file>
+
+<file path=ppt/notesSlides/notesSlide7.xml><?xml version="1.0" encoding="utf-8"?>
+<p:notes xmlns:a="http://schemas.openxmlformats.org/drawingml/2006/main" xmlns:r="http://schemas.openxmlformats.org/officeDocument/2006/relationships" xmlns:p="http://schemas.openxmlformats.org/presentationml/2006/main">
+  <p:cSld>
+    <p:spTree>
+      <p:nvGrpSpPr>
+        <p:cNvPr id="1" name=""/>
+        <p:cNvGrpSpPr/>
+        <p:nvPr/>
+      </p:nvGrpSpPr>
+      <p:grpSpPr>
+        <a:xfrm>
+          <a:off x="0" y="0"/>
+          <a:ext cx="0" cy="0"/>
+          <a:chOff x="0" y="0"/>
+          <a:chExt cx="0" cy="0"/>
+        </a:xfrm>
+      </p:grpSpPr>
+      <p:sp>
+        <p:nvSpPr>
+          <p:cNvPr id="78" name="CustomShape 1"/>
           <p:cNvSpPr/>
           <p:nvPr/>
         </p:nvSpPr>
         <p:spPr>
           <a:xfrm>
-            <a:off x="3849840" y="9379080"/>
-            <a:ext cx="2946240" cy="493560"/>
+            <a:off x="681120" y="4691160"/>
+            <a:ext cx="5437080" cy="4443480"/>
           </a:xfrm>
           <a:custGeom>
             <a:avLst/>
@@ -1235,79 +1266,17 @@
           </a:effectRef>
           <a:fontRef idx="minor"/>
         </p:style>
-        <p:txBody>
-          <a:bodyPr anchor="b"/>
-          <a:lstStyle/>
-          <a:p>
-            <a:pPr algn="r">
-              <a:lnSpc>
-                <a:spcPct val="100000"/>
-              </a:lnSpc>
-            </a:pPr>
-            <a:fld id="{1237F835-7D25-4B88-A08C-B3F7E89CF45B}" type="slidenum">
-              <a:rPr lang="en-IN" sz="1200" b="0" strike="noStrike" spc="-1">
-                <a:solidFill>
-                  <a:srgbClr val="000000"/>
-                </a:solidFill>
-                <a:uFill>
-                  <a:solidFill>
-                    <a:srgbClr val="FFFFFF"/>
-                  </a:solidFill>
-                </a:uFill>
-                <a:latin typeface="Arial"/>
-                <a:ea typeface="+mn-ea"/>
-              </a:rPr>
-              <a:t>6</a:t>
-            </a:fld>
-            <a:endParaRPr lang="en-IN" sz="1800" b="0" strike="noStrike" spc="-1">
-              <a:solidFill>
-                <a:srgbClr val="000000"/>
-              </a:solidFill>
-              <a:uFill>
-                <a:solidFill>
-                  <a:srgbClr val="FFFFFF"/>
-                </a:solidFill>
-              </a:uFill>
-              <a:latin typeface="Arial"/>
-            </a:endParaRPr>
-          </a:p>
-        </p:txBody>
-      </p:sp>
-    </p:spTree>
-  </p:cSld>
-  <p:clrMapOvr>
-    <a:masterClrMapping/>
-  </p:clrMapOvr>
-</p:notes>
-</file>
-
-<file path=ppt/notesSlides/notesSlide7.xml><?xml version="1.0" encoding="utf-8"?>
-<p:notes xmlns:a="http://schemas.openxmlformats.org/drawingml/2006/main" xmlns:r="http://schemas.openxmlformats.org/officeDocument/2006/relationships" xmlns:p="http://schemas.openxmlformats.org/presentationml/2006/main">
-  <p:cSld>
-    <p:spTree>
-      <p:nvGrpSpPr>
-        <p:cNvPr id="1" name=""/>
-        <p:cNvGrpSpPr/>
-        <p:nvPr/>
-      </p:nvGrpSpPr>
-      <p:grpSpPr>
-        <a:xfrm>
-          <a:off x="0" y="0"/>
-          <a:ext cx="0" cy="0"/>
-          <a:chOff x="0" y="0"/>
-          <a:chExt cx="0" cy="0"/>
-        </a:xfrm>
-      </p:grpSpPr>
-      <p:sp>
-        <p:nvSpPr>
-          <p:cNvPr id="80" name="CustomShape 1"/>
+      </p:sp>
+      <p:sp>
+        <p:nvSpPr>
+          <p:cNvPr id="79" name="CustomShape 2"/>
           <p:cNvSpPr/>
           <p:nvPr/>
         </p:nvSpPr>
         <p:spPr>
           <a:xfrm>
-            <a:off x="681120" y="4691160"/>
-            <a:ext cx="5437080" cy="4443480"/>
+            <a:off x="3849840" y="9379080"/>
+            <a:ext cx="2946240" cy="493560"/>
           </a:xfrm>
           <a:custGeom>
             <a:avLst/>
@@ -1353,17 +1322,79 @@
           </a:effectRef>
           <a:fontRef idx="minor"/>
         </p:style>
-      </p:sp>
-      <p:sp>
-        <p:nvSpPr>
-          <p:cNvPr id="81" name="CustomShape 2"/>
+        <p:txBody>
+          <a:bodyPr anchor="b"/>
+          <a:lstStyle/>
+          <a:p>
+            <a:pPr algn="r">
+              <a:lnSpc>
+                <a:spcPct val="100000"/>
+              </a:lnSpc>
+            </a:pPr>
+            <a:fld id="{1237F835-7D25-4B88-A08C-B3F7E89CF45B}" type="slidenum">
+              <a:rPr lang="en-IN" sz="1200" b="0" strike="noStrike" spc="-1">
+                <a:solidFill>
+                  <a:srgbClr val="000000"/>
+                </a:solidFill>
+                <a:uFill>
+                  <a:solidFill>
+                    <a:srgbClr val="FFFFFF"/>
+                  </a:solidFill>
+                </a:uFill>
+                <a:latin typeface="Arial"/>
+                <a:ea typeface="+mn-ea"/>
+              </a:rPr>
+              <a:t>7</a:t>
+            </a:fld>
+            <a:endParaRPr lang="en-IN" sz="1800" b="0" strike="noStrike" spc="-1">
+              <a:solidFill>
+                <a:srgbClr val="000000"/>
+              </a:solidFill>
+              <a:uFill>
+                <a:solidFill>
+                  <a:srgbClr val="FFFFFF"/>
+                </a:solidFill>
+              </a:uFill>
+              <a:latin typeface="Arial"/>
+            </a:endParaRPr>
+          </a:p>
+        </p:txBody>
+      </p:sp>
+    </p:spTree>
+  </p:cSld>
+  <p:clrMapOvr>
+    <a:masterClrMapping/>
+  </p:clrMapOvr>
+</p:notes>
+</file>
+
+<file path=ppt/notesSlides/notesSlide8.xml><?xml version="1.0" encoding="utf-8"?>
+<p:notes xmlns:a="http://schemas.openxmlformats.org/drawingml/2006/main" xmlns:r="http://schemas.openxmlformats.org/officeDocument/2006/relationships" xmlns:p="http://schemas.openxmlformats.org/presentationml/2006/main">
+  <p:cSld>
+    <p:spTree>
+      <p:nvGrpSpPr>
+        <p:cNvPr id="1" name=""/>
+        <p:cNvGrpSpPr/>
+        <p:nvPr/>
+      </p:nvGrpSpPr>
+      <p:grpSpPr>
+        <a:xfrm>
+          <a:off x="0" y="0"/>
+          <a:ext cx="0" cy="0"/>
+          <a:chOff x="0" y="0"/>
+          <a:chExt cx="0" cy="0"/>
+        </a:xfrm>
+      </p:grpSpPr>
+      <p:sp>
+        <p:nvSpPr>
+          <p:cNvPr id="80" name="CustomShape 1"/>
           <p:cNvSpPr/>
           <p:nvPr/>
         </p:nvSpPr>
         <p:spPr>
           <a:xfrm>
-            <a:off x="3849840" y="9379080"/>
-            <a:ext cx="2946240" cy="493560"/>
+            <a:off x="681120" y="4691160"/>
+            <a:ext cx="5437080" cy="4443480"/>
           </a:xfrm>
           <a:custGeom>
             <a:avLst/>
@@ -1409,6 +1440,62 @@
           </a:effectRef>
           <a:fontRef idx="minor"/>
         </p:style>
+      </p:sp>
+      <p:sp>
+        <p:nvSpPr>
+          <p:cNvPr id="81" name="CustomShape 2"/>
+          <p:cNvSpPr/>
+          <p:nvPr/>
+        </p:nvSpPr>
+        <p:spPr>
+          <a:xfrm>
+            <a:off x="3849840" y="9379080"/>
+            <a:ext cx="2946240" cy="493560"/>
+          </a:xfrm>
+          <a:custGeom>
+            <a:avLst/>
+            <a:gdLst/>
+            <a:ahLst/>
+            <a:cxnLst/>
+            <a:rect l="l" t="t" r="r" b="b"/>
+            <a:pathLst>
+              <a:path w="21600" h="21600">
+                <a:moveTo>
+                  <a:pt x="0" y="0"/>
+                </a:moveTo>
+                <a:lnTo>
+                  <a:pt x="21600" y="0"/>
+                </a:lnTo>
+                <a:lnTo>
+                  <a:pt x="21600" y="21600"/>
+                </a:lnTo>
+                <a:lnTo>
+                  <a:pt x="0" y="21600"/>
+                </a:lnTo>
+                <a:lnTo>
+                  <a:pt x="0" y="0"/>
+                </a:lnTo>
+                <a:close/>
+              </a:path>
+            </a:pathLst>
+          </a:custGeom>
+          <a:noFill/>
+          <a:ln>
+            <a:noFill/>
+          </a:ln>
+        </p:spPr>
+        <p:style>
+          <a:lnRef idx="0">
+            <a:scrgbClr r="0" g="0" b="0"/>
+          </a:lnRef>
+          <a:fillRef idx="0">
+            <a:scrgbClr r="0" g="0" b="0"/>
+          </a:fillRef>
+          <a:effectRef idx="0">
+            <a:scrgbClr r="0" g="0" b="0"/>
+          </a:effectRef>
+          <a:fontRef idx="minor"/>
+        </p:style>
         <p:txBody>
           <a:bodyPr anchor="b"/>
           <a:lstStyle/>
@@ -1431,7 +1518,7 @@
                 <a:latin typeface="Arial"/>
                 <a:ea typeface="+mn-ea"/>
               </a:rPr>
-              <a:t>7</a:t>
+              <a:t>8</a:t>
             </a:fld>
             <a:endParaRPr lang="en-IN" sz="1800" b="0" strike="noStrike" spc="-1">
               <a:solidFill>
@@ -1455,7 +1542,7 @@
 </p:notes>
 </file>
 
-<file path=ppt/notesSlides/notesSlide8.xml><?xml version="1.0" encoding="utf-8"?>
+<file path=ppt/notesSlides/notesSlide9.xml><?xml version="1.0" encoding="utf-8"?>
 <p:notes xmlns:a="http://schemas.openxmlformats.org/drawingml/2006/main" xmlns:r="http://schemas.openxmlformats.org/officeDocument/2006/relationships" xmlns:p="http://schemas.openxmlformats.org/presentationml/2006/main">
   <p:cSld>
     <p:spTree>
@@ -5038,7 +5125,7 @@
         <p:spPr>
           <a:xfrm>
             <a:off x="372862" y="1753967"/>
-            <a:ext cx="7901126" cy="2031325"/>
+            <a:ext cx="7901126" cy="1754326"/>
           </a:xfrm>
           <a:prstGeom prst="rect">
             <a:avLst/>
@@ -5051,20 +5138,6 @@
           </a:bodyPr>
           <a:lstStyle/>
           <a:p>
-            <a:pPr marL="285750" indent="-285750">
-              <a:buFont typeface="Arial" panose="020B0604020202020204" pitchFamily="34" charset="0"/>
-              <a:buChar char="•"/>
-            </a:pPr>
-            <a:r>
-              <a:rPr lang="en-IN" dirty="0"/>
-              <a:t>We are in the process of creating a polished UI for the application</a:t>
-            </a:r>
-          </a:p>
-          <a:p>
-            <a:pPr marL="285750" indent="-285750">
-              <a:buFont typeface="Arial" panose="020B0604020202020204" pitchFamily="34" charset="0"/>
-              <a:buChar char="•"/>
-            </a:pPr>
             <a:endParaRPr lang="en-IN" dirty="0"/>
           </a:p>
           <a:p>
@@ -5272,8 +5345,8 @@
         </p:nvSpPr>
         <p:spPr>
           <a:xfrm>
-            <a:off x="372862" y="1753967"/>
-            <a:ext cx="7901126" cy="4801314"/>
+            <a:off x="372862" y="1617840"/>
+            <a:ext cx="7901126" cy="5078313"/>
           </a:xfrm>
           <a:prstGeom prst="rect">
             <a:avLst/>
@@ -5340,7 +5413,7 @@
             </a:pPr>
             <a:r>
               <a:rPr lang="en-IN" dirty="0"/>
-              <a:t>The query was matched with the video by converting each into a vector space and found the similarities between the two feature spaces. This entire process was added into a pipeline to run as an executable.</a:t>
+              <a:t>The query was matched with the video by converting each into a vector space and found the similarities between the two feature spaces. This entire process was added into a pipeline to run as an executable with a user friendly GUI.</a:t>
             </a:r>
           </a:p>
         </p:txBody>
@@ -5407,7 +5480,7 @@
       </p:grpSpPr>
       <p:sp>
         <p:nvSpPr>
-          <p:cNvPr id="62" name="CustomShape 1"/>
+          <p:cNvPr id="60" name="CustomShape 1"/>
           <p:cNvSpPr/>
           <p:nvPr/>
         </p:nvSpPr>
@@ -5441,14 +5514,14 @@
       </p:sp>
       <p:sp>
         <p:nvSpPr>
-          <p:cNvPr id="63" name="CustomShape 2"/>
+          <p:cNvPr id="61" name="CustomShape 2"/>
           <p:cNvSpPr/>
           <p:nvPr/>
         </p:nvSpPr>
         <p:spPr>
           <a:xfrm>
             <a:off x="1371600" y="1143000"/>
-            <a:ext cx="7772400" cy="395280"/>
+            <a:ext cx="7772400" cy="456120"/>
           </a:xfrm>
           <a:prstGeom prst="rect">
             <a:avLst/>
@@ -5480,7 +5553,7 @@
               </a:lnSpc>
             </a:pPr>
             <a:r>
-              <a:rPr lang="en-IN" sz="2000" b="0" strike="noStrike" spc="-1">
+              <a:rPr lang="en-IN" sz="2400" b="0" strike="noStrike" spc="-1" dirty="0">
                 <a:solidFill>
                   <a:srgbClr val="FF0000"/>
                 </a:solidFill>
@@ -5491,9 +5564,9 @@
                 </a:uFill>
                 <a:latin typeface="Trebuchet MS"/>
               </a:rPr>
-              <a:t>Any obstacles/challenges and any Assistance Required </a:t>
-            </a:r>
-            <a:endParaRPr lang="en-IN" sz="1800" b="0" strike="noStrike" spc="-1">
+              <a:t>Screenshots</a:t>
+            </a:r>
+            <a:endParaRPr lang="en-IN" sz="1800" b="0" strike="noStrike" spc="-1" dirty="0">
               <a:solidFill>
                 <a:srgbClr val="000000"/>
               </a:solidFill>
@@ -5507,44 +5580,102 @@
           </a:p>
         </p:txBody>
       </p:sp>
-      <p:sp>
-        <p:nvSpPr>
-          <p:cNvPr id="64" name="CustomShape 3"/>
-          <p:cNvSpPr/>
-          <p:nvPr/>
-        </p:nvSpPr>
-        <p:spPr>
-          <a:xfrm>
-            <a:off x="533520" y="1828800"/>
-            <a:ext cx="7010280" cy="4724280"/>
-          </a:xfrm>
-          <a:prstGeom prst="rect">
-            <a:avLst/>
-          </a:prstGeom>
-          <a:noFill/>
-          <a:ln>
-            <a:noFill/>
-          </a:ln>
-        </p:spPr>
-        <p:style>
-          <a:lnRef idx="0">
-            <a:scrgbClr r="0" g="0" b="0"/>
-          </a:lnRef>
-          <a:fillRef idx="0">
-            <a:scrgbClr r="0" g="0" b="0"/>
-          </a:fillRef>
-          <a:effectRef idx="0">
-            <a:scrgbClr r="0" g="0" b="0"/>
-          </a:effectRef>
-          <a:fontRef idx="minor"/>
-        </p:style>
-      </p:sp>
-      <p:sp>
-        <p:nvSpPr>
-          <p:cNvPr id="5" name="TextBox 4">
+      <p:pic>
+        <p:nvPicPr>
+          <p:cNvPr id="3" name="Picture 2">
             <a:extLst>
               <a:ext uri="{FF2B5EF4-FFF2-40B4-BE49-F238E27FC236}">
-                <a16:creationId xmlns:a16="http://schemas.microsoft.com/office/drawing/2014/main" id="{69EF3183-ED4C-4065-A20D-6E43687B9D41}"/>
+                <a16:creationId xmlns:a16="http://schemas.microsoft.com/office/drawing/2014/main" id="{FD8386AC-3641-41E5-8237-F4D238C0A12B}"/>
+              </a:ext>
+            </a:extLst>
+          </p:cNvPr>
+          <p:cNvPicPr>
+            <a:picLocks noChangeAspect="1"/>
+          </p:cNvPicPr>
+          <p:nvPr/>
+        </p:nvPicPr>
+        <p:blipFill>
+          <a:blip r:embed="rId3"/>
+          <a:stretch>
+            <a:fillRect/>
+          </a:stretch>
+        </p:blipFill>
+        <p:spPr>
+          <a:xfrm>
+            <a:off x="591180" y="1729980"/>
+            <a:ext cx="3024573" cy="2209682"/>
+          </a:xfrm>
+          <a:prstGeom prst="rect">
+            <a:avLst/>
+          </a:prstGeom>
+        </p:spPr>
+      </p:pic>
+      <p:pic>
+        <p:nvPicPr>
+          <p:cNvPr id="6" name="Picture 5">
+            <a:extLst>
+              <a:ext uri="{FF2B5EF4-FFF2-40B4-BE49-F238E27FC236}">
+                <a16:creationId xmlns:a16="http://schemas.microsoft.com/office/drawing/2014/main" id="{FA39B3E3-96D6-4A71-8CDA-60DAE1AF8400}"/>
+              </a:ext>
+            </a:extLst>
+          </p:cNvPr>
+          <p:cNvPicPr>
+            <a:picLocks noChangeAspect="1"/>
+          </p:cNvPicPr>
+          <p:nvPr/>
+        </p:nvPicPr>
+        <p:blipFill>
+          <a:blip r:embed="rId4"/>
+          <a:stretch>
+            <a:fillRect/>
+          </a:stretch>
+        </p:blipFill>
+        <p:spPr>
+          <a:xfrm>
+            <a:off x="4829078" y="1729980"/>
+            <a:ext cx="3035943" cy="2209682"/>
+          </a:xfrm>
+          <a:prstGeom prst="rect">
+            <a:avLst/>
+          </a:prstGeom>
+        </p:spPr>
+      </p:pic>
+      <p:pic>
+        <p:nvPicPr>
+          <p:cNvPr id="8" name="Picture 7">
+            <a:extLst>
+              <a:ext uri="{FF2B5EF4-FFF2-40B4-BE49-F238E27FC236}">
+                <a16:creationId xmlns:a16="http://schemas.microsoft.com/office/drawing/2014/main" id="{FDE701D8-C0CD-40EA-9DBB-AAD1F3E42370}"/>
+              </a:ext>
+            </a:extLst>
+          </p:cNvPr>
+          <p:cNvPicPr>
+            <a:picLocks noChangeAspect="1"/>
+          </p:cNvPicPr>
+          <p:nvPr/>
+        </p:nvPicPr>
+        <p:blipFill>
+          <a:blip r:embed="rId5"/>
+          <a:stretch>
+            <a:fillRect/>
+          </a:stretch>
+        </p:blipFill>
+        <p:spPr>
+          <a:xfrm>
+            <a:off x="2445669" y="4310389"/>
+            <a:ext cx="3615655" cy="2042122"/>
+          </a:xfrm>
+          <a:prstGeom prst="rect">
+            <a:avLst/>
+          </a:prstGeom>
+        </p:spPr>
+      </p:pic>
+      <p:sp>
+        <p:nvSpPr>
+          <p:cNvPr id="9" name="TextBox 8">
+            <a:extLst>
+              <a:ext uri="{FF2B5EF4-FFF2-40B4-BE49-F238E27FC236}">
+                <a16:creationId xmlns:a16="http://schemas.microsoft.com/office/drawing/2014/main" id="{A183E9CF-BAD0-4003-8023-6AB103402270}"/>
               </a:ext>
             </a:extLst>
           </p:cNvPr>
@@ -5553,8 +5684,8 @@
         </p:nvSpPr>
         <p:spPr>
           <a:xfrm>
-            <a:off x="372862" y="1940400"/>
-            <a:ext cx="7901126" cy="2585323"/>
+            <a:off x="1659273" y="4007456"/>
+            <a:ext cx="910827" cy="253916"/>
           </a:xfrm>
           <a:prstGeom prst="rect">
             <a:avLst/>
@@ -5562,57 +5693,176 @@
           <a:noFill/>
         </p:spPr>
         <p:txBody>
-          <a:bodyPr wrap="square" rtlCol="0">
+          <a:bodyPr wrap="none" rtlCol="0">
             <a:spAutoFit/>
           </a:bodyPr>
           <a:lstStyle/>
           <a:p>
-            <a:pPr marL="285750" indent="-285750">
-              <a:buFont typeface="Arial" panose="020B0604020202020204" pitchFamily="34" charset="0"/>
-              <a:buChar char="•"/>
-            </a:pPr>
-            <a:r>
-              <a:rPr lang="en-IN" dirty="0"/>
-              <a:t>Time is a constraint – a large portion of the video tagging unit takes a lot of time to generate tags since it uses various approaches and then picks the best one.</a:t>
-            </a:r>
-          </a:p>
-          <a:p>
-            <a:pPr marL="285750" indent="-285750">
-              <a:buFont typeface="Arial" panose="020B0604020202020204" pitchFamily="34" charset="0"/>
-              <a:buChar char="•"/>
-            </a:pPr>
-            <a:endParaRPr lang="en-IN" dirty="0"/>
-          </a:p>
-          <a:p>
-            <a:pPr marL="285750" indent="-285750">
-              <a:buFont typeface="Arial" panose="020B0604020202020204" pitchFamily="34" charset="0"/>
-              <a:buChar char="•"/>
-            </a:pPr>
-            <a:r>
-              <a:rPr lang="en-IN" dirty="0"/>
-              <a:t>Speech recognition – It is not that accurate when it comes to other languages apart from English, leading to mismatched outputs.</a:t>
-            </a:r>
-          </a:p>
-          <a:p>
-            <a:pPr marL="285750" indent="-285750">
-              <a:buFont typeface="Arial" panose="020B0604020202020204" pitchFamily="34" charset="0"/>
-              <a:buChar char="•"/>
-            </a:pPr>
-            <a:endParaRPr lang="en-IN" dirty="0"/>
-          </a:p>
-          <a:p>
-            <a:pPr marL="285750" indent="-285750">
-              <a:buFont typeface="Arial" panose="020B0604020202020204" pitchFamily="34" charset="0"/>
-              <a:buChar char="•"/>
-            </a:pPr>
-            <a:r>
-              <a:rPr lang="en-IN" dirty="0"/>
-              <a:t>Filtering of keywords – The semi-supervised approach tends to result in a few irrelevant keywords even after taking frequency into consideration. </a:t>
+            <a:r>
+              <a:rPr lang="en-IN" sz="1050" b="1" dirty="0"/>
+              <a:t>GUI Screen</a:t>
             </a:r>
           </a:p>
         </p:txBody>
       </p:sp>
+      <p:sp>
+        <p:nvSpPr>
+          <p:cNvPr id="12" name="TextBox 11">
+            <a:extLst>
+              <a:ext uri="{FF2B5EF4-FFF2-40B4-BE49-F238E27FC236}">
+                <a16:creationId xmlns:a16="http://schemas.microsoft.com/office/drawing/2014/main" id="{7C930651-DFA4-42FB-BF8A-7A06393E99AF}"/>
+              </a:ext>
+            </a:extLst>
+          </p:cNvPr>
+          <p:cNvSpPr txBox="1"/>
+          <p:nvPr/>
+        </p:nvSpPr>
+        <p:spPr>
+          <a:xfrm>
+            <a:off x="5001969" y="4007456"/>
+            <a:ext cx="2898550" cy="253916"/>
+          </a:xfrm>
+          <a:prstGeom prst="rect">
+            <a:avLst/>
+          </a:prstGeom>
+          <a:noFill/>
+        </p:spPr>
+        <p:txBody>
+          <a:bodyPr wrap="none" rtlCol="0">
+            <a:spAutoFit/>
+          </a:bodyPr>
+          <a:lstStyle/>
+          <a:p>
+            <a:r>
+              <a:rPr lang="en-IN" sz="1050" b="1" dirty="0"/>
+              <a:t>After clicking on search and making query</a:t>
+            </a:r>
+          </a:p>
+        </p:txBody>
+      </p:sp>
+      <p:sp>
+        <p:nvSpPr>
+          <p:cNvPr id="13" name="TextBox 12">
+            <a:extLst>
+              <a:ext uri="{FF2B5EF4-FFF2-40B4-BE49-F238E27FC236}">
+                <a16:creationId xmlns:a16="http://schemas.microsoft.com/office/drawing/2014/main" id="{297A2936-8C1F-4494-85C3-9D7A451F4136}"/>
+              </a:ext>
+            </a:extLst>
+          </p:cNvPr>
+          <p:cNvSpPr txBox="1"/>
+          <p:nvPr/>
+        </p:nvSpPr>
+        <p:spPr>
+          <a:xfrm>
+            <a:off x="3721941" y="6351388"/>
+            <a:ext cx="1119217" cy="253916"/>
+          </a:xfrm>
+          <a:prstGeom prst="rect">
+            <a:avLst/>
+          </a:prstGeom>
+          <a:noFill/>
+        </p:spPr>
+        <p:txBody>
+          <a:bodyPr wrap="none" rtlCol="0">
+            <a:spAutoFit/>
+          </a:bodyPr>
+          <a:lstStyle/>
+          <a:p>
+            <a:r>
+              <a:rPr lang="en-IN" sz="1050" b="1" dirty="0"/>
+              <a:t>Matched video</a:t>
+            </a:r>
+          </a:p>
+        </p:txBody>
+      </p:sp>
+      <p:cxnSp>
+        <p:nvCxnSpPr>
+          <p:cNvPr id="11" name="Straight Arrow Connector 10">
+            <a:extLst>
+              <a:ext uri="{FF2B5EF4-FFF2-40B4-BE49-F238E27FC236}">
+                <a16:creationId xmlns:a16="http://schemas.microsoft.com/office/drawing/2014/main" id="{F375AE53-80E0-4355-8666-2F3163B7661A}"/>
+              </a:ext>
+            </a:extLst>
+          </p:cNvPr>
+          <p:cNvCxnSpPr/>
+          <p:nvPr/>
+        </p:nvCxnSpPr>
+        <p:spPr>
+          <a:xfrm>
+            <a:off x="3875714" y="2834821"/>
+            <a:ext cx="763398" cy="0"/>
+          </a:xfrm>
+          <a:prstGeom prst="straightConnector1">
+            <a:avLst/>
+          </a:prstGeom>
+          <a:ln>
+            <a:tailEnd type="triangle"/>
+          </a:ln>
+        </p:spPr>
+        <p:style>
+          <a:lnRef idx="1">
+            <a:schemeClr val="accent1"/>
+          </a:lnRef>
+          <a:fillRef idx="0">
+            <a:schemeClr val="accent1"/>
+          </a:fillRef>
+          <a:effectRef idx="0">
+            <a:schemeClr val="accent1"/>
+          </a:effectRef>
+          <a:fontRef idx="minor">
+            <a:schemeClr val="tx1"/>
+          </a:fontRef>
+        </p:style>
+      </p:cxnSp>
+      <p:cxnSp>
+        <p:nvCxnSpPr>
+          <p:cNvPr id="20" name="Connector: Elbow 19">
+            <a:extLst>
+              <a:ext uri="{FF2B5EF4-FFF2-40B4-BE49-F238E27FC236}">
+                <a16:creationId xmlns:a16="http://schemas.microsoft.com/office/drawing/2014/main" id="{C4B229AF-9A87-4508-A14A-44B44C080559}"/>
+              </a:ext>
+            </a:extLst>
+          </p:cNvPr>
+          <p:cNvCxnSpPr>
+            <a:cxnSpLocks/>
+          </p:cNvCxnSpPr>
+          <p:nvPr/>
+        </p:nvCxnSpPr>
+        <p:spPr>
+          <a:xfrm rot="5400000">
+            <a:off x="5943654" y="4576591"/>
+            <a:ext cx="914295" cy="419449"/>
+          </a:xfrm>
+          <a:prstGeom prst="bentConnector3">
+            <a:avLst>
+              <a:gd name="adj1" fmla="val 100465"/>
+            </a:avLst>
+          </a:prstGeom>
+          <a:ln>
+            <a:tailEnd type="triangle"/>
+          </a:ln>
+        </p:spPr>
+        <p:style>
+          <a:lnRef idx="1">
+            <a:schemeClr val="accent1"/>
+          </a:lnRef>
+          <a:fillRef idx="0">
+            <a:schemeClr val="accent1"/>
+          </a:fillRef>
+          <a:effectRef idx="0">
+            <a:schemeClr val="accent1"/>
+          </a:effectRef>
+          <a:fontRef idx="minor">
+            <a:schemeClr val="tx1"/>
+          </a:fontRef>
+        </p:style>
+      </p:cxnSp>
     </p:spTree>
+    <p:extLst>
+      <p:ext uri="{BB962C8B-B14F-4D97-AF65-F5344CB8AC3E}">
+        <p14:creationId xmlns:p14="http://schemas.microsoft.com/office/powerpoint/2010/main" val="55594042"/>
+      </p:ext>
+    </p:extLst>
   </p:cSld>
   <p:clrMapOvr>
     <a:masterClrMapping/>
@@ -5674,7 +5924,7 @@
       </p:grpSpPr>
       <p:sp>
         <p:nvSpPr>
-          <p:cNvPr id="65" name="CustomShape 1"/>
+          <p:cNvPr id="62" name="CustomShape 1"/>
           <p:cNvSpPr/>
           <p:nvPr/>
         </p:nvSpPr>
@@ -5708,7 +5958,7 @@
       </p:sp>
       <p:sp>
         <p:nvSpPr>
-          <p:cNvPr id="66" name="CustomShape 2"/>
+          <p:cNvPr id="63" name="CustomShape 2"/>
           <p:cNvSpPr/>
           <p:nvPr/>
         </p:nvSpPr>
@@ -5758,7 +6008,7 @@
                 </a:uFill>
                 <a:latin typeface="Trebuchet MS"/>
               </a:rPr>
-              <a:t>Key Deliverables for the next milestone</a:t>
+              <a:t>Any obstacles/challenges and any Assistance Required </a:t>
             </a:r>
             <a:endParaRPr lang="en-IN" sz="1800" b="0" strike="noStrike" spc="-1">
               <a:solidFill>
@@ -5776,14 +6026,14 @@
       </p:sp>
       <p:sp>
         <p:nvSpPr>
-          <p:cNvPr id="67" name="CustomShape 3"/>
+          <p:cNvPr id="64" name="CustomShape 3"/>
           <p:cNvSpPr/>
           <p:nvPr/>
         </p:nvSpPr>
         <p:spPr>
           <a:xfrm>
             <a:off x="533520" y="1828800"/>
-            <a:ext cx="7619760" cy="4724280"/>
+            <a:ext cx="7010280" cy="4724280"/>
           </a:xfrm>
           <a:prstGeom prst="rect">
             <a:avLst/>
@@ -5805,113 +6055,13 @@
           </a:effectRef>
           <a:fontRef idx="minor"/>
         </p:style>
-        <p:txBody>
-          <a:bodyPr lIns="90000" tIns="45000" rIns="90000" bIns="45000"/>
-          <a:lstStyle/>
-          <a:p>
-            <a:pPr marL="342720" indent="-339840">
-              <a:lnSpc>
-                <a:spcPct val="100000"/>
-              </a:lnSpc>
-            </a:pPr>
-            <a:r>
-              <a:rPr lang="en-IN" sz="2400" b="0" strike="noStrike" spc="-1">
-                <a:solidFill>
-                  <a:srgbClr val="0000FF"/>
-                </a:solidFill>
-                <a:uFill>
-                  <a:solidFill>
-                    <a:srgbClr val="FFFFFF"/>
-                  </a:solidFill>
-                </a:uFill>
-                <a:latin typeface="Trebuchet MS"/>
-              </a:rPr>
-              <a:t> </a:t>
-            </a:r>
-            <a:endParaRPr lang="en-IN" sz="1800" b="0" strike="noStrike" spc="-1">
-              <a:solidFill>
-                <a:srgbClr val="000000"/>
-              </a:solidFill>
-              <a:uFill>
-                <a:solidFill>
-                  <a:srgbClr val="FFFFFF"/>
-                </a:solidFill>
-              </a:uFill>
-              <a:latin typeface="Arial"/>
-            </a:endParaRPr>
-          </a:p>
-          <a:p>
-            <a:pPr algn="just">
-              <a:lnSpc>
-                <a:spcPct val="100000"/>
-              </a:lnSpc>
-            </a:pPr>
-            <a:r>
-              <a:rPr lang="en-IN" sz="2400" b="0" strike="noStrike" spc="-1">
-                <a:solidFill>
-                  <a:srgbClr val="0000FF"/>
-                </a:solidFill>
-                <a:uFill>
-                  <a:solidFill>
-                    <a:srgbClr val="FFFFFF"/>
-                  </a:solidFill>
-                </a:uFill>
-                <a:latin typeface="Trebuchet MS"/>
-              </a:rPr>
-              <a:t> </a:t>
-            </a:r>
-            <a:endParaRPr lang="en-IN" sz="1800" b="0" strike="noStrike" spc="-1">
-              <a:solidFill>
-                <a:srgbClr val="000000"/>
-              </a:solidFill>
-              <a:uFill>
-                <a:solidFill>
-                  <a:srgbClr val="FFFFFF"/>
-                </a:solidFill>
-              </a:uFill>
-              <a:latin typeface="Arial"/>
-            </a:endParaRPr>
-          </a:p>
-          <a:p>
-            <a:pPr marL="342720" indent="-339840">
-              <a:lnSpc>
-                <a:spcPct val="100000"/>
-              </a:lnSpc>
-            </a:pPr>
-            <a:r>
-              <a:rPr lang="en-IN" sz="2400" b="0" strike="noStrike" spc="-1">
-                <a:solidFill>
-                  <a:srgbClr val="0000FF"/>
-                </a:solidFill>
-                <a:uFill>
-                  <a:solidFill>
-                    <a:srgbClr val="FFFFFF"/>
-                  </a:solidFill>
-                </a:uFill>
-                <a:latin typeface="Trebuchet MS"/>
-              </a:rPr>
-              <a:t> </a:t>
-            </a:r>
-            <a:endParaRPr lang="en-IN" sz="1800" b="0" strike="noStrike" spc="-1">
-              <a:solidFill>
-                <a:srgbClr val="000000"/>
-              </a:solidFill>
-              <a:uFill>
-                <a:solidFill>
-                  <a:srgbClr val="FFFFFF"/>
-                </a:solidFill>
-              </a:uFill>
-              <a:latin typeface="Arial"/>
-            </a:endParaRPr>
-          </a:p>
-        </p:txBody>
       </p:sp>
       <p:sp>
         <p:nvSpPr>
           <p:cNvPr id="5" name="TextBox 4">
             <a:extLst>
               <a:ext uri="{FF2B5EF4-FFF2-40B4-BE49-F238E27FC236}">
-                <a16:creationId xmlns:a16="http://schemas.microsoft.com/office/drawing/2014/main" id="{00AE953F-3186-4822-AC1C-2D875CF6427A}"/>
+                <a16:creationId xmlns:a16="http://schemas.microsoft.com/office/drawing/2014/main" id="{69EF3183-ED4C-4065-A20D-6E43687B9D41}"/>
               </a:ext>
             </a:extLst>
           </p:cNvPr>
@@ -5920,8 +6070,8 @@
         </p:nvSpPr>
         <p:spPr>
           <a:xfrm>
-            <a:off x="392837" y="1908360"/>
-            <a:ext cx="7901126" cy="2031325"/>
+            <a:off x="372862" y="1940400"/>
+            <a:ext cx="7901126" cy="2862322"/>
           </a:xfrm>
           <a:prstGeom prst="rect">
             <a:avLst/>
@@ -5940,7 +6090,7 @@
             </a:pPr>
             <a:r>
               <a:rPr lang="en-IN" dirty="0"/>
-              <a:t>We hope to be able to perfect the speech recognition and tag generation.</a:t>
+              <a:t>Time is a constraint – a large portion of the video tagging unit takes a lot of time to generate tags since it also relies on an online lookup.</a:t>
             </a:r>
           </a:p>
           <a:p>
@@ -5957,7 +6107,7 @@
             </a:pPr>
             <a:r>
               <a:rPr lang="en-IN" dirty="0"/>
-              <a:t>We will also try to reduce the time taken to run the application. </a:t>
+              <a:t>Speech recognition – It is not that accurate when it comes to other languages apart from English, leading to mismatched outputs. It sometimes requires the user to speak clearly without any additional ambient noise.</a:t>
             </a:r>
           </a:p>
           <a:p>
@@ -5974,15 +6124,8 @@
             </a:pPr>
             <a:r>
               <a:rPr lang="en-IN" dirty="0"/>
-              <a:t>We are trying to develop an easy to use and intuitive UI for the application.</a:t>
-            </a:r>
-          </a:p>
-          <a:p>
-            <a:pPr marL="285750" indent="-285750">
-              <a:buFont typeface="Arial" panose="020B0604020202020204" pitchFamily="34" charset="0"/>
-              <a:buChar char="•"/>
-            </a:pPr>
-            <a:endParaRPr lang="en-IN" dirty="0"/>
+              <a:t>Filtering of keywords – The semi-supervised approach tends to result in a few irrelevant keywords even after taking frequency into consideration. </a:t>
+            </a:r>
           </a:p>
         </p:txBody>
       </p:sp>
@@ -6048,7 +6191,7 @@
       </p:grpSpPr>
       <p:sp>
         <p:nvSpPr>
-          <p:cNvPr id="68" name="CustomShape 1"/>
+          <p:cNvPr id="65" name="CustomShape 1"/>
           <p:cNvSpPr/>
           <p:nvPr/>
         </p:nvSpPr>
@@ -6082,7 +6225,7 @@
       </p:sp>
       <p:sp>
         <p:nvSpPr>
-          <p:cNvPr id="69" name="CustomShape 2"/>
+          <p:cNvPr id="66" name="CustomShape 2"/>
           <p:cNvSpPr/>
           <p:nvPr/>
         </p:nvSpPr>
@@ -6132,7 +6275,7 @@
                 </a:uFill>
                 <a:latin typeface="Trebuchet MS"/>
               </a:rPr>
-              <a:t>Summary</a:t>
+              <a:t>Key Deliverables for the next milestone</a:t>
             </a:r>
             <a:endParaRPr lang="en-IN" sz="1800" b="0" strike="noStrike" spc="-1">
               <a:solidFill>
@@ -6150,7 +6293,7 @@
       </p:sp>
       <p:sp>
         <p:nvSpPr>
-          <p:cNvPr id="70" name="CustomShape 3"/>
+          <p:cNvPr id="67" name="CustomShape 3"/>
           <p:cNvSpPr/>
           <p:nvPr/>
         </p:nvSpPr>
@@ -6285,7 +6428,7 @@
           <p:cNvPr id="5" name="TextBox 4">
             <a:extLst>
               <a:ext uri="{FF2B5EF4-FFF2-40B4-BE49-F238E27FC236}">
-                <a16:creationId xmlns:a16="http://schemas.microsoft.com/office/drawing/2014/main" id="{AA7F93CD-2B6F-482C-AD40-8081643D01BA}"/>
+                <a16:creationId xmlns:a16="http://schemas.microsoft.com/office/drawing/2014/main" id="{00AE953F-3186-4822-AC1C-2D875CF6427A}"/>
               </a:ext>
             </a:extLst>
           </p:cNvPr>
@@ -6294,8 +6437,8 @@
         </p:nvSpPr>
         <p:spPr>
           <a:xfrm>
-            <a:off x="372862" y="1709580"/>
-            <a:ext cx="7901126" cy="4801314"/>
+            <a:off x="392837" y="1908360"/>
+            <a:ext cx="7901126" cy="1477328"/>
           </a:xfrm>
           <a:prstGeom prst="rect">
             <a:avLst/>
@@ -6313,16 +6456,8 @@
               <a:buChar char="•"/>
             </a:pPr>
             <a:r>
-              <a:rPr lang="en-US" dirty="0"/>
-              <a:t>We have used a </a:t>
-            </a:r>
-            <a:r>
-              <a:rPr lang="en-US" b="1" dirty="0"/>
-              <a:t>novel approach </a:t>
-            </a:r>
-            <a:r>
-              <a:rPr lang="en-US" dirty="0"/>
-              <a:t>by not only using computer vision to perform object detection and tagging but have also combined it with NLP techniques such as sequence models to generate descriptions of scenes with objects such that they can be tagged and described without manually watching them. We also used word embeddings to obtain relevant searches on not just a contextual level but also at a semantic level.</a:t>
+              <a:rPr lang="en-IN" dirty="0"/>
+              <a:t>We hope to be able to perfect the speech recognition and tag generation.</a:t>
             </a:r>
           </a:p>
           <a:p>
@@ -6330,68 +6465,34 @@
               <a:buFont typeface="Arial" panose="020B0604020202020204" pitchFamily="34" charset="0"/>
               <a:buChar char="•"/>
             </a:pPr>
-            <a:r>
-              <a:rPr lang="en-US" dirty="0"/>
-              <a:t>Our work is going as planned by our team and we have finished about 90% of the expected project.</a:t>
-            </a:r>
+            <a:endParaRPr lang="en-IN" dirty="0"/>
           </a:p>
           <a:p>
             <a:pPr marL="285750" indent="-285750">
               <a:buFont typeface="Arial" panose="020B0604020202020204" pitchFamily="34" charset="0"/>
               <a:buChar char="•"/>
             </a:pPr>
-            <a:endParaRPr lang="en-US" dirty="0"/>
+            <a:r>
+              <a:rPr lang="en-IN" dirty="0"/>
+              <a:t>We will also try to reduce the time taken to run the application. </a:t>
+            </a:r>
           </a:p>
           <a:p>
             <a:pPr marL="285750" indent="-285750">
               <a:buFont typeface="Arial" panose="020B0604020202020204" pitchFamily="34" charset="0"/>
               <a:buChar char="•"/>
             </a:pPr>
-            <a:r>
-              <a:rPr lang="en-US" dirty="0"/>
-              <a:t>We hope to continue to work on this and finish our planned objectives and start work on the final integration, which will be our next goal</a:t>
-            </a:r>
+            <a:endParaRPr lang="en-IN" dirty="0"/>
           </a:p>
           <a:p>
             <a:pPr marL="285750" indent="-285750">
               <a:buFont typeface="Arial" panose="020B0604020202020204" pitchFamily="34" charset="0"/>
               <a:buChar char="•"/>
             </a:pPr>
-            <a:endParaRPr lang="en-US" dirty="0"/>
-          </a:p>
-          <a:p>
-            <a:pPr marL="285750" indent="-285750">
-              <a:buFont typeface="Arial" panose="020B0604020202020204" pitchFamily="34" charset="0"/>
-              <a:buChar char="•"/>
-            </a:pPr>
-            <a:r>
-              <a:rPr lang="en-US" dirty="0"/>
-              <a:t>We are also working on the efficiency and are trying to reduce latency and bring in faster results.</a:t>
-            </a:r>
-          </a:p>
-          <a:p>
-            <a:pPr marL="285750" indent="-285750">
-              <a:buFont typeface="Arial" panose="020B0604020202020204" pitchFamily="34" charset="0"/>
-              <a:buChar char="•"/>
-            </a:pPr>
-            <a:endParaRPr lang="en-US" dirty="0"/>
-          </a:p>
-          <a:p>
-            <a:pPr marL="285750" indent="-285750">
-              <a:buFont typeface="Arial" panose="020B0604020202020204" pitchFamily="34" charset="0"/>
-              <a:buChar char="•"/>
-            </a:pPr>
-            <a:r>
-              <a:rPr lang="en-US" dirty="0"/>
-              <a:t>Our code can be found at </a:t>
-            </a:r>
-            <a:r>
-              <a:rPr lang="en-US" dirty="0">
-                <a:hlinkClick r:id="rId3"/>
-              </a:rPr>
-              <a:t>https://bit.ly/intelnlq</a:t>
-            </a:r>
-            <a:endParaRPr lang="en-IN" b="1" i="1" dirty="0"/>
+            <a:r>
+              <a:rPr lang="en-IN" dirty="0"/>
+              <a:t>We will prepare the paper abstract required for the final presentation.</a:t>
+            </a:r>
           </a:p>
         </p:txBody>
       </p:sp>
@@ -6431,6 +6532,401 @@
 </file>
 
 <file path=ppt/slides/slide8.xml><?xml version="1.0" encoding="utf-8"?>
+<p:sld xmlns:a="http://schemas.openxmlformats.org/drawingml/2006/main" xmlns:r="http://schemas.openxmlformats.org/officeDocument/2006/relationships" xmlns:p="http://schemas.openxmlformats.org/presentationml/2006/main">
+  <p:cSld>
+    <p:bg>
+      <p:bgPr>
+        <a:solidFill>
+          <a:srgbClr val="FFFFFF"/>
+        </a:solidFill>
+        <a:effectLst/>
+      </p:bgPr>
+    </p:bg>
+    <p:spTree>
+      <p:nvGrpSpPr>
+        <p:cNvPr id="1" name=""/>
+        <p:cNvGrpSpPr/>
+        <p:nvPr/>
+      </p:nvGrpSpPr>
+      <p:grpSpPr>
+        <a:xfrm>
+          <a:off x="0" y="0"/>
+          <a:ext cx="0" cy="0"/>
+          <a:chOff x="0" y="0"/>
+          <a:chExt cx="0" cy="0"/>
+        </a:xfrm>
+      </p:grpSpPr>
+      <p:sp>
+        <p:nvSpPr>
+          <p:cNvPr id="68" name="CustomShape 1"/>
+          <p:cNvSpPr/>
+          <p:nvPr/>
+        </p:nvSpPr>
+        <p:spPr>
+          <a:xfrm>
+            <a:off x="1523880" y="1581120"/>
+            <a:ext cx="7620120" cy="36720"/>
+          </a:xfrm>
+          <a:prstGeom prst="rect">
+            <a:avLst/>
+          </a:prstGeom>
+          <a:solidFill>
+            <a:srgbClr val="33CCCC"/>
+          </a:solidFill>
+          <a:ln>
+            <a:noFill/>
+          </a:ln>
+        </p:spPr>
+        <p:style>
+          <a:lnRef idx="0">
+            <a:scrgbClr r="0" g="0" b="0"/>
+          </a:lnRef>
+          <a:fillRef idx="0">
+            <a:scrgbClr r="0" g="0" b="0"/>
+          </a:fillRef>
+          <a:effectRef idx="0">
+            <a:scrgbClr r="0" g="0" b="0"/>
+          </a:effectRef>
+          <a:fontRef idx="minor"/>
+        </p:style>
+      </p:sp>
+      <p:sp>
+        <p:nvSpPr>
+          <p:cNvPr id="69" name="CustomShape 2"/>
+          <p:cNvSpPr/>
+          <p:nvPr/>
+        </p:nvSpPr>
+        <p:spPr>
+          <a:xfrm>
+            <a:off x="1371600" y="1143000"/>
+            <a:ext cx="7772400" cy="395280"/>
+          </a:xfrm>
+          <a:prstGeom prst="rect">
+            <a:avLst/>
+          </a:prstGeom>
+          <a:noFill/>
+          <a:ln>
+            <a:noFill/>
+          </a:ln>
+        </p:spPr>
+        <p:style>
+          <a:lnRef idx="0">
+            <a:scrgbClr r="0" g="0" b="0"/>
+          </a:lnRef>
+          <a:fillRef idx="0">
+            <a:scrgbClr r="0" g="0" b="0"/>
+          </a:fillRef>
+          <a:effectRef idx="0">
+            <a:scrgbClr r="0" g="0" b="0"/>
+          </a:effectRef>
+          <a:fontRef idx="minor"/>
+        </p:style>
+        <p:txBody>
+          <a:bodyPr lIns="90000" tIns="45000" rIns="90000" bIns="45000"/>
+          <a:lstStyle/>
+          <a:p>
+            <a:pPr marL="342720" indent="-339840" algn="r">
+              <a:lnSpc>
+                <a:spcPct val="100000"/>
+              </a:lnSpc>
+            </a:pPr>
+            <a:r>
+              <a:rPr lang="en-IN" sz="2000" b="0" strike="noStrike" spc="-1">
+                <a:solidFill>
+                  <a:srgbClr val="FF0000"/>
+                </a:solidFill>
+                <a:uFill>
+                  <a:solidFill>
+                    <a:srgbClr val="FFFFFF"/>
+                  </a:solidFill>
+                </a:uFill>
+                <a:latin typeface="Trebuchet MS"/>
+              </a:rPr>
+              <a:t>Summary</a:t>
+            </a:r>
+            <a:endParaRPr lang="en-IN" sz="1800" b="0" strike="noStrike" spc="-1">
+              <a:solidFill>
+                <a:srgbClr val="000000"/>
+              </a:solidFill>
+              <a:uFill>
+                <a:solidFill>
+                  <a:srgbClr val="FFFFFF"/>
+                </a:solidFill>
+              </a:uFill>
+              <a:latin typeface="Arial"/>
+            </a:endParaRPr>
+          </a:p>
+        </p:txBody>
+      </p:sp>
+      <p:sp>
+        <p:nvSpPr>
+          <p:cNvPr id="70" name="CustomShape 3"/>
+          <p:cNvSpPr/>
+          <p:nvPr/>
+        </p:nvSpPr>
+        <p:spPr>
+          <a:xfrm>
+            <a:off x="533520" y="1828800"/>
+            <a:ext cx="7619760" cy="4724280"/>
+          </a:xfrm>
+          <a:prstGeom prst="rect">
+            <a:avLst/>
+          </a:prstGeom>
+          <a:noFill/>
+          <a:ln>
+            <a:noFill/>
+          </a:ln>
+        </p:spPr>
+        <p:style>
+          <a:lnRef idx="0">
+            <a:scrgbClr r="0" g="0" b="0"/>
+          </a:lnRef>
+          <a:fillRef idx="0">
+            <a:scrgbClr r="0" g="0" b="0"/>
+          </a:fillRef>
+          <a:effectRef idx="0">
+            <a:scrgbClr r="0" g="0" b="0"/>
+          </a:effectRef>
+          <a:fontRef idx="minor"/>
+        </p:style>
+        <p:txBody>
+          <a:bodyPr lIns="90000" tIns="45000" rIns="90000" bIns="45000"/>
+          <a:lstStyle/>
+          <a:p>
+            <a:pPr marL="342720" indent="-339840">
+              <a:lnSpc>
+                <a:spcPct val="100000"/>
+              </a:lnSpc>
+            </a:pPr>
+            <a:r>
+              <a:rPr lang="en-IN" sz="2400" b="0" strike="noStrike" spc="-1">
+                <a:solidFill>
+                  <a:srgbClr val="0000FF"/>
+                </a:solidFill>
+                <a:uFill>
+                  <a:solidFill>
+                    <a:srgbClr val="FFFFFF"/>
+                  </a:solidFill>
+                </a:uFill>
+                <a:latin typeface="Trebuchet MS"/>
+              </a:rPr>
+              <a:t> </a:t>
+            </a:r>
+            <a:endParaRPr lang="en-IN" sz="1800" b="0" strike="noStrike" spc="-1">
+              <a:solidFill>
+                <a:srgbClr val="000000"/>
+              </a:solidFill>
+              <a:uFill>
+                <a:solidFill>
+                  <a:srgbClr val="FFFFFF"/>
+                </a:solidFill>
+              </a:uFill>
+              <a:latin typeface="Arial"/>
+            </a:endParaRPr>
+          </a:p>
+          <a:p>
+            <a:pPr algn="just">
+              <a:lnSpc>
+                <a:spcPct val="100000"/>
+              </a:lnSpc>
+            </a:pPr>
+            <a:r>
+              <a:rPr lang="en-IN" sz="2400" b="0" strike="noStrike" spc="-1">
+                <a:solidFill>
+                  <a:srgbClr val="0000FF"/>
+                </a:solidFill>
+                <a:uFill>
+                  <a:solidFill>
+                    <a:srgbClr val="FFFFFF"/>
+                  </a:solidFill>
+                </a:uFill>
+                <a:latin typeface="Trebuchet MS"/>
+              </a:rPr>
+              <a:t> </a:t>
+            </a:r>
+            <a:endParaRPr lang="en-IN" sz="1800" b="0" strike="noStrike" spc="-1">
+              <a:solidFill>
+                <a:srgbClr val="000000"/>
+              </a:solidFill>
+              <a:uFill>
+                <a:solidFill>
+                  <a:srgbClr val="FFFFFF"/>
+                </a:solidFill>
+              </a:uFill>
+              <a:latin typeface="Arial"/>
+            </a:endParaRPr>
+          </a:p>
+          <a:p>
+            <a:pPr marL="342720" indent="-339840">
+              <a:lnSpc>
+                <a:spcPct val="100000"/>
+              </a:lnSpc>
+            </a:pPr>
+            <a:r>
+              <a:rPr lang="en-IN" sz="2400" b="0" strike="noStrike" spc="-1">
+                <a:solidFill>
+                  <a:srgbClr val="0000FF"/>
+                </a:solidFill>
+                <a:uFill>
+                  <a:solidFill>
+                    <a:srgbClr val="FFFFFF"/>
+                  </a:solidFill>
+                </a:uFill>
+                <a:latin typeface="Trebuchet MS"/>
+              </a:rPr>
+              <a:t> </a:t>
+            </a:r>
+            <a:endParaRPr lang="en-IN" sz="1800" b="0" strike="noStrike" spc="-1">
+              <a:solidFill>
+                <a:srgbClr val="000000"/>
+              </a:solidFill>
+              <a:uFill>
+                <a:solidFill>
+                  <a:srgbClr val="FFFFFF"/>
+                </a:solidFill>
+              </a:uFill>
+              <a:latin typeface="Arial"/>
+            </a:endParaRPr>
+          </a:p>
+        </p:txBody>
+      </p:sp>
+      <p:sp>
+        <p:nvSpPr>
+          <p:cNvPr id="5" name="TextBox 4">
+            <a:extLst>
+              <a:ext uri="{FF2B5EF4-FFF2-40B4-BE49-F238E27FC236}">
+                <a16:creationId xmlns:a16="http://schemas.microsoft.com/office/drawing/2014/main" id="{AA7F93CD-2B6F-482C-AD40-8081643D01BA}"/>
+              </a:ext>
+            </a:extLst>
+          </p:cNvPr>
+          <p:cNvSpPr txBox="1"/>
+          <p:nvPr/>
+        </p:nvSpPr>
+        <p:spPr>
+          <a:xfrm>
+            <a:off x="372862" y="1709580"/>
+            <a:ext cx="7901126" cy="4247317"/>
+          </a:xfrm>
+          <a:prstGeom prst="rect">
+            <a:avLst/>
+          </a:prstGeom>
+          <a:noFill/>
+        </p:spPr>
+        <p:txBody>
+          <a:bodyPr wrap="square" rtlCol="0">
+            <a:spAutoFit/>
+          </a:bodyPr>
+          <a:lstStyle/>
+          <a:p>
+            <a:pPr marL="285750" indent="-285750">
+              <a:buFont typeface="Arial" panose="020B0604020202020204" pitchFamily="34" charset="0"/>
+              <a:buChar char="•"/>
+            </a:pPr>
+            <a:r>
+              <a:rPr lang="en-US" dirty="0"/>
+              <a:t>We have used a </a:t>
+            </a:r>
+            <a:r>
+              <a:rPr lang="en-US" b="1" dirty="0"/>
+              <a:t>novel approach </a:t>
+            </a:r>
+            <a:r>
+              <a:rPr lang="en-US" dirty="0"/>
+              <a:t>by not only using computer vision to perform object detection and tagging but have also combined it with NLP techniques such as sequence models to generate descriptions of scenes with objects such that they can be tagged and described without manually watching them. We also used word embeddings to obtain relevant searches on not just a contextual level but also at a semantic level.</a:t>
+            </a:r>
+          </a:p>
+          <a:p>
+            <a:pPr marL="285750" indent="-285750">
+              <a:buFont typeface="Arial" panose="020B0604020202020204" pitchFamily="34" charset="0"/>
+              <a:buChar char="•"/>
+            </a:pPr>
+            <a:endParaRPr lang="en-US" dirty="0"/>
+          </a:p>
+          <a:p>
+            <a:pPr marL="285750" indent="-285750">
+              <a:buFont typeface="Arial" panose="020B0604020202020204" pitchFamily="34" charset="0"/>
+              <a:buChar char="•"/>
+            </a:pPr>
+            <a:r>
+              <a:rPr lang="en-US" dirty="0"/>
+              <a:t>Our work is going as planned by our team and we have finished and achieved the key deliverables for the final presentation.</a:t>
+            </a:r>
+          </a:p>
+          <a:p>
+            <a:endParaRPr lang="en-US" dirty="0"/>
+          </a:p>
+          <a:p>
+            <a:pPr marL="285750" indent="-285750">
+              <a:buFont typeface="Arial" panose="020B0604020202020204" pitchFamily="34" charset="0"/>
+              <a:buChar char="•"/>
+            </a:pPr>
+            <a:r>
+              <a:rPr lang="en-US" dirty="0"/>
+              <a:t>We are currently working on the efficiency and are trying to reduce latency and bring in faster results.</a:t>
+            </a:r>
+          </a:p>
+          <a:p>
+            <a:pPr marL="285750" indent="-285750">
+              <a:buFont typeface="Arial" panose="020B0604020202020204" pitchFamily="34" charset="0"/>
+              <a:buChar char="•"/>
+            </a:pPr>
+            <a:endParaRPr lang="en-US" dirty="0"/>
+          </a:p>
+          <a:p>
+            <a:pPr marL="285750" indent="-285750">
+              <a:buFont typeface="Arial" panose="020B0604020202020204" pitchFamily="34" charset="0"/>
+              <a:buChar char="•"/>
+            </a:pPr>
+            <a:r>
+              <a:rPr lang="en-US" dirty="0"/>
+              <a:t>Our code can be found at </a:t>
+            </a:r>
+            <a:r>
+              <a:rPr lang="en-US" dirty="0">
+                <a:hlinkClick r:id="rId3"/>
+              </a:rPr>
+              <a:t>https://bit.ly/intelnlq</a:t>
+            </a:r>
+            <a:endParaRPr lang="en-IN" b="1" i="1" dirty="0"/>
+          </a:p>
+        </p:txBody>
+      </p:sp>
+    </p:spTree>
+  </p:cSld>
+  <p:clrMapOvr>
+    <a:masterClrMapping/>
+  </p:clrMapOvr>
+  <p:timing>
+    <p:tnLst>
+      <p:par>
+        <p:cTn id="1" dur="indefinite" restart="never" nodeType="tmRoot">
+          <p:childTnLst>
+            <p:seq>
+              <p:cTn id="2" dur="indefinite" nodeType="mainSeq"/>
+              <p:prevCondLst>
+                <p:cond evt="onPrev" delay="0">
+                  <p:tgtEl>
+                    <p:sldTgt/>
+                  </p:tgtEl>
+                </p:cond>
+              </p:prevCondLst>
+              <p:nextCondLst>
+                <p:cond evt="onNext" delay="0">
+                  <p:tgtEl>
+                    <p:sldTgt/>
+                  </p:tgtEl>
+                </p:cond>
+              </p:nextCondLst>
+            </p:seq>
+          </p:childTnLst>
+        </p:cTn>
+      </p:par>
+    </p:tnLst>
+  </p:timing>
+</p:sld>
+</file>
+
+<file path=ppt/slides/slide9.xml><?xml version="1.0" encoding="utf-8"?>
 <p:sld xmlns:a="http://schemas.openxmlformats.org/drawingml/2006/main" xmlns:r="http://schemas.openxmlformats.org/officeDocument/2006/relationships" xmlns:p="http://schemas.openxmlformats.org/presentationml/2006/main">
   <p:cSld>
     <p:bg>

</xml_diff>